<commit_message>
1st review pptx added
</commit_message>
<xml_diff>
--- a/DP G7 first review.pptx
+++ b/DP G7 first review.pptx
@@ -23990,7 +23990,54 @@
             <a:pPr marL="342900" lvl="0" indent="-339725">
               <a:buSzPts val="2400"/>
             </a:pPr>
-            <a:endParaRPr sz="2000" dirty="0"/>
+            <a:r>
+              <a:rPr lang="en-IN" sz="2000" b="1" dirty="0" smtClean="0"/>
+              <a:t>		</a:t>
+            </a:r>
+            <a:r>
+              <a:rPr lang="en-IN" sz="2000" b="1" u="sng" dirty="0" smtClean="0"/>
+              <a:t>Guide</a:t>
+            </a:r>
+          </a:p>
+          <a:p>
+            <a:pPr marL="342900" lvl="0" indent="-339725">
+              <a:buSzPts val="2400"/>
+            </a:pPr>
+            <a:r>
+              <a:rPr lang="en-IN" sz="2000" b="1" dirty="0" smtClean="0"/>
+              <a:t>	Mrs</a:t>
+            </a:r>
+            <a:r>
+              <a:rPr lang="en-IN" sz="2000" b="1" dirty="0"/>
+              <a:t> </a:t>
+            </a:r>
+            <a:r>
+              <a:rPr lang="en-IN" sz="2000" b="1" dirty="0" err="1" smtClean="0"/>
+              <a:t>Namitha</a:t>
+            </a:r>
+            <a:r>
+              <a:rPr lang="en-IN" sz="2000" b="1" dirty="0" smtClean="0"/>
+              <a:t> T N, </a:t>
+            </a:r>
+          </a:p>
+          <a:p>
+            <a:pPr marL="342900" lvl="0" indent="-339725">
+              <a:buSzPts val="2400"/>
+            </a:pPr>
+            <a:r>
+              <a:rPr lang="en-IN" sz="2000" b="1" dirty="0" smtClean="0"/>
+              <a:t>   Assistant Professor,</a:t>
+            </a:r>
+          </a:p>
+          <a:p>
+            <a:pPr marL="342900" lvl="0" indent="-339725">
+              <a:buSzPts val="2400"/>
+            </a:pPr>
+            <a:r>
+              <a:rPr lang="en-IN" sz="2000" b="1" dirty="0" smtClean="0"/>
+              <a:t>     CSE Department</a:t>
+            </a:r>
+            <a:endParaRPr sz="2000" b="1" dirty="0"/>
           </a:p>
         </p:txBody>
       </p:sp>

</xml_diff>